<commit_message>
Add images of info about user flow
</commit_message>
<xml_diff>
--- a/03-Build-wireframes-&-low-fidelity-prototypes/Goal-statement/Project-portfolio/Goal Statement-Animal-Shelter.pptx
+++ b/03-Build-wireframes-&-low-fidelity-prototypes/Goal-statement/Project-portfolio/Goal Statement-Animal-Shelter.pptx
@@ -53,7 +53,7 @@
       </p:grpSpPr>
       <p:sp>
         <p:nvSpPr>
-          <p:cNvPr id="44" name="PlaceHolder 1"/>
+          <p:cNvPr id="45" name="PlaceHolder 1"/>
           <p:cNvSpPr>
             <a:spLocks noGrp="1"/>
           </p:cNvSpPr>
@@ -93,7 +93,7 @@
       </p:sp>
       <p:sp>
         <p:nvSpPr>
-          <p:cNvPr id="45" name="PlaceHolder 2"/>
+          <p:cNvPr id="46" name="PlaceHolder 2"/>
           <p:cNvSpPr>
             <a:spLocks noGrp="1"/>
           </p:cNvSpPr>
@@ -136,7 +136,7 @@
       </p:sp>
       <p:sp>
         <p:nvSpPr>
-          <p:cNvPr id="46" name="PlaceHolder 3"/>
+          <p:cNvPr id="47" name="PlaceHolder 3"/>
           <p:cNvSpPr>
             <a:spLocks noGrp="1"/>
           </p:cNvSpPr>
@@ -201,7 +201,7 @@
       </p:grpSpPr>
       <p:sp>
         <p:nvSpPr>
-          <p:cNvPr id="47" name="PlaceHolder 1"/>
+          <p:cNvPr id="48" name="PlaceHolder 1"/>
           <p:cNvSpPr>
             <a:spLocks noGrp="1"/>
           </p:cNvSpPr>
@@ -241,7 +241,7 @@
       </p:sp>
       <p:sp>
         <p:nvSpPr>
-          <p:cNvPr id="48" name="PlaceHolder 2"/>
+          <p:cNvPr id="49" name="PlaceHolder 2"/>
           <p:cNvSpPr>
             <a:spLocks noGrp="1"/>
           </p:cNvSpPr>
@@ -284,7 +284,7 @@
       </p:sp>
       <p:sp>
         <p:nvSpPr>
-          <p:cNvPr id="49" name="PlaceHolder 3"/>
+          <p:cNvPr id="50" name="PlaceHolder 3"/>
           <p:cNvSpPr>
             <a:spLocks noGrp="1"/>
           </p:cNvSpPr>
@@ -327,7 +327,7 @@
       </p:sp>
       <p:sp>
         <p:nvSpPr>
-          <p:cNvPr id="50" name="PlaceHolder 4"/>
+          <p:cNvPr id="51" name="PlaceHolder 4"/>
           <p:cNvSpPr>
             <a:spLocks noGrp="1"/>
           </p:cNvSpPr>
@@ -370,7 +370,7 @@
       </p:sp>
       <p:sp>
         <p:nvSpPr>
-          <p:cNvPr id="51" name="PlaceHolder 5"/>
+          <p:cNvPr id="52" name="PlaceHolder 5"/>
           <p:cNvSpPr>
             <a:spLocks noGrp="1"/>
           </p:cNvSpPr>
@@ -435,7 +435,7 @@
       </p:grpSpPr>
       <p:sp>
         <p:nvSpPr>
-          <p:cNvPr id="52" name="PlaceHolder 1"/>
+          <p:cNvPr id="53" name="PlaceHolder 1"/>
           <p:cNvSpPr>
             <a:spLocks noGrp="1"/>
           </p:cNvSpPr>
@@ -475,7 +475,7 @@
       </p:sp>
       <p:sp>
         <p:nvSpPr>
-          <p:cNvPr id="53" name="PlaceHolder 2"/>
+          <p:cNvPr id="54" name="PlaceHolder 2"/>
           <p:cNvSpPr>
             <a:spLocks noGrp="1"/>
           </p:cNvSpPr>
@@ -518,7 +518,7 @@
       </p:sp>
       <p:sp>
         <p:nvSpPr>
-          <p:cNvPr id="54" name="PlaceHolder 3"/>
+          <p:cNvPr id="55" name="PlaceHolder 3"/>
           <p:cNvSpPr>
             <a:spLocks noGrp="1"/>
           </p:cNvSpPr>
@@ -561,7 +561,7 @@
       </p:sp>
       <p:sp>
         <p:nvSpPr>
-          <p:cNvPr id="55" name="PlaceHolder 4"/>
+          <p:cNvPr id="56" name="PlaceHolder 4"/>
           <p:cNvSpPr>
             <a:spLocks noGrp="1"/>
           </p:cNvSpPr>
@@ -604,7 +604,7 @@
       </p:sp>
       <p:sp>
         <p:nvSpPr>
-          <p:cNvPr id="56" name="PlaceHolder 5"/>
+          <p:cNvPr id="57" name="PlaceHolder 5"/>
           <p:cNvSpPr>
             <a:spLocks noGrp="1"/>
           </p:cNvSpPr>
@@ -647,7 +647,7 @@
       </p:sp>
       <p:sp>
         <p:nvSpPr>
-          <p:cNvPr id="57" name="PlaceHolder 6"/>
+          <p:cNvPr id="58" name="PlaceHolder 6"/>
           <p:cNvSpPr>
             <a:spLocks noGrp="1"/>
           </p:cNvSpPr>
@@ -690,7 +690,7 @@
       </p:sp>
       <p:sp>
         <p:nvSpPr>
-          <p:cNvPr id="58" name="PlaceHolder 7"/>
+          <p:cNvPr id="59" name="PlaceHolder 7"/>
           <p:cNvSpPr>
             <a:spLocks noGrp="1"/>
           </p:cNvSpPr>
@@ -755,7 +755,7 @@
       </p:grpSpPr>
       <p:sp>
         <p:nvSpPr>
-          <p:cNvPr id="23" name="PlaceHolder 1"/>
+          <p:cNvPr id="24" name="PlaceHolder 1"/>
           <p:cNvSpPr>
             <a:spLocks noGrp="1"/>
           </p:cNvSpPr>
@@ -795,7 +795,7 @@
       </p:sp>
       <p:sp>
         <p:nvSpPr>
-          <p:cNvPr id="24" name="PlaceHolder 2"/>
+          <p:cNvPr id="25" name="PlaceHolder 2"/>
           <p:cNvSpPr>
             <a:spLocks noGrp="1"/>
           </p:cNvSpPr>
@@ -857,7 +857,7 @@
       </p:grpSpPr>
       <p:sp>
         <p:nvSpPr>
-          <p:cNvPr id="25" name="PlaceHolder 1"/>
+          <p:cNvPr id="26" name="PlaceHolder 1"/>
           <p:cNvSpPr>
             <a:spLocks noGrp="1"/>
           </p:cNvSpPr>
@@ -897,7 +897,7 @@
       </p:sp>
       <p:sp>
         <p:nvSpPr>
-          <p:cNvPr id="26" name="PlaceHolder 2"/>
+          <p:cNvPr id="27" name="PlaceHolder 2"/>
           <p:cNvSpPr>
             <a:spLocks noGrp="1"/>
           </p:cNvSpPr>
@@ -962,7 +962,7 @@
       </p:grpSpPr>
       <p:sp>
         <p:nvSpPr>
-          <p:cNvPr id="27" name="PlaceHolder 1"/>
+          <p:cNvPr id="28" name="PlaceHolder 1"/>
           <p:cNvSpPr>
             <a:spLocks noGrp="1"/>
           </p:cNvSpPr>
@@ -1002,7 +1002,7 @@
       </p:sp>
       <p:sp>
         <p:nvSpPr>
-          <p:cNvPr id="28" name="PlaceHolder 2"/>
+          <p:cNvPr id="29" name="PlaceHolder 2"/>
           <p:cNvSpPr>
             <a:spLocks noGrp="1"/>
           </p:cNvSpPr>
@@ -1045,7 +1045,7 @@
       </p:sp>
       <p:sp>
         <p:nvSpPr>
-          <p:cNvPr id="29" name="PlaceHolder 3"/>
+          <p:cNvPr id="30" name="PlaceHolder 3"/>
           <p:cNvSpPr>
             <a:spLocks noGrp="1"/>
           </p:cNvSpPr>
@@ -1110,7 +1110,7 @@
       </p:grpSpPr>
       <p:sp>
         <p:nvSpPr>
-          <p:cNvPr id="30" name="PlaceHolder 1"/>
+          <p:cNvPr id="31" name="PlaceHolder 1"/>
           <p:cNvSpPr>
             <a:spLocks noGrp="1"/>
           </p:cNvSpPr>
@@ -1172,7 +1172,7 @@
       </p:grpSpPr>
       <p:sp>
         <p:nvSpPr>
-          <p:cNvPr id="31" name="PlaceHolder 1"/>
+          <p:cNvPr id="32" name="PlaceHolder 1"/>
           <p:cNvSpPr>
             <a:spLocks noGrp="1"/>
           </p:cNvSpPr>
@@ -1232,7 +1232,7 @@
       </p:grpSpPr>
       <p:sp>
         <p:nvSpPr>
-          <p:cNvPr id="32" name="PlaceHolder 1"/>
+          <p:cNvPr id="33" name="PlaceHolder 1"/>
           <p:cNvSpPr>
             <a:spLocks noGrp="1"/>
           </p:cNvSpPr>
@@ -1272,7 +1272,7 @@
       </p:sp>
       <p:sp>
         <p:nvSpPr>
-          <p:cNvPr id="33" name="PlaceHolder 2"/>
+          <p:cNvPr id="34" name="PlaceHolder 2"/>
           <p:cNvSpPr>
             <a:spLocks noGrp="1"/>
           </p:cNvSpPr>
@@ -1315,7 +1315,7 @@
       </p:sp>
       <p:sp>
         <p:nvSpPr>
-          <p:cNvPr id="34" name="PlaceHolder 3"/>
+          <p:cNvPr id="35" name="PlaceHolder 3"/>
           <p:cNvSpPr>
             <a:spLocks noGrp="1"/>
           </p:cNvSpPr>
@@ -1358,7 +1358,7 @@
       </p:sp>
       <p:sp>
         <p:nvSpPr>
-          <p:cNvPr id="35" name="PlaceHolder 4"/>
+          <p:cNvPr id="36" name="PlaceHolder 4"/>
           <p:cNvSpPr>
             <a:spLocks noGrp="1"/>
           </p:cNvSpPr>
@@ -1423,7 +1423,7 @@
       </p:grpSpPr>
       <p:sp>
         <p:nvSpPr>
-          <p:cNvPr id="36" name="PlaceHolder 1"/>
+          <p:cNvPr id="37" name="PlaceHolder 1"/>
           <p:cNvSpPr>
             <a:spLocks noGrp="1"/>
           </p:cNvSpPr>
@@ -1463,7 +1463,7 @@
       </p:sp>
       <p:sp>
         <p:nvSpPr>
-          <p:cNvPr id="37" name="PlaceHolder 2"/>
+          <p:cNvPr id="38" name="PlaceHolder 2"/>
           <p:cNvSpPr>
             <a:spLocks noGrp="1"/>
           </p:cNvSpPr>
@@ -1506,7 +1506,7 @@
       </p:sp>
       <p:sp>
         <p:nvSpPr>
-          <p:cNvPr id="38" name="PlaceHolder 3"/>
+          <p:cNvPr id="39" name="PlaceHolder 3"/>
           <p:cNvSpPr>
             <a:spLocks noGrp="1"/>
           </p:cNvSpPr>
@@ -1549,7 +1549,7 @@
       </p:sp>
       <p:sp>
         <p:nvSpPr>
-          <p:cNvPr id="39" name="PlaceHolder 4"/>
+          <p:cNvPr id="40" name="PlaceHolder 4"/>
           <p:cNvSpPr>
             <a:spLocks noGrp="1"/>
           </p:cNvSpPr>
@@ -1614,7 +1614,7 @@
       </p:grpSpPr>
       <p:sp>
         <p:nvSpPr>
-          <p:cNvPr id="40" name="PlaceHolder 1"/>
+          <p:cNvPr id="41" name="PlaceHolder 1"/>
           <p:cNvSpPr>
             <a:spLocks noGrp="1"/>
           </p:cNvSpPr>
@@ -1654,7 +1654,7 @@
       </p:sp>
       <p:sp>
         <p:nvSpPr>
-          <p:cNvPr id="41" name="PlaceHolder 2"/>
+          <p:cNvPr id="42" name="PlaceHolder 2"/>
           <p:cNvSpPr>
             <a:spLocks noGrp="1"/>
           </p:cNvSpPr>
@@ -1697,7 +1697,7 @@
       </p:sp>
       <p:sp>
         <p:nvSpPr>
-          <p:cNvPr id="42" name="PlaceHolder 3"/>
+          <p:cNvPr id="43" name="PlaceHolder 3"/>
           <p:cNvSpPr>
             <a:spLocks noGrp="1"/>
           </p:cNvSpPr>
@@ -1740,7 +1740,7 @@
       </p:sp>
       <p:sp>
         <p:nvSpPr>
-          <p:cNvPr id="43" name="PlaceHolder 4"/>
+          <p:cNvPr id="44" name="PlaceHolder 4"/>
           <p:cNvSpPr>
             <a:spLocks noGrp="1"/>
           </p:cNvSpPr>
@@ -3779,6 +3779,55 @@
                 <a:latin typeface="Arial"/>
               </a:rPr>
               <a:t>Seventh Outline Level</a:t>
+            </a:r>
+            <a:endParaRPr b="0" lang="en-US" sz="1400" spc="-1" strike="noStrike">
+              <a:solidFill>
+                <a:srgbClr val="000000"/>
+              </a:solidFill>
+              <a:latin typeface="Arial"/>
+            </a:endParaRPr>
+          </a:p>
+        </p:txBody>
+      </p:sp>
+      <p:sp>
+        <p:nvSpPr>
+          <p:cNvPr id="23" name="PlaceHolder 6"/>
+          <p:cNvSpPr>
+            <a:spLocks noGrp="1"/>
+          </p:cNvSpPr>
+          <p:nvPr>
+            <p:ph type="title"/>
+          </p:nvPr>
+        </p:nvSpPr>
+        <p:spPr>
+          <a:xfrm>
+            <a:off x="457200" y="205200"/>
+            <a:ext cx="8229240" cy="858600"/>
+          </a:xfrm>
+          <a:prstGeom prst="rect">
+            <a:avLst/>
+          </a:prstGeom>
+          <a:noFill/>
+          <a:ln w="0">
+            <a:noFill/>
+          </a:ln>
+        </p:spPr>
+        <p:txBody>
+          <a:bodyPr lIns="0" rIns="0" tIns="0" bIns="0" anchor="ctr">
+            <a:noAutofit/>
+          </a:bodyPr>
+          <a:p>
+            <a:pPr indent="0">
+              <a:buNone/>
+            </a:pPr>
+            <a:r>
+              <a:rPr b="0" lang="en-US" sz="1400" spc="-1" strike="noStrike">
+                <a:solidFill>
+                  <a:srgbClr val="000000"/>
+                </a:solidFill>
+                <a:latin typeface="Arial"/>
+              </a:rPr>
+              <a:t>Click to edit the title text format</a:t>
             </a:r>
             <a:endParaRPr b="0" lang="en-US" sz="1400" spc="-1" strike="noStrike">
               <a:solidFill>
@@ -3828,7 +3877,7 @@
       </p:grpSpPr>
       <p:sp>
         <p:nvSpPr>
-          <p:cNvPr id="59" name="PlaceHolder 1"/>
+          <p:cNvPr id="60" name="PlaceHolder 1"/>
           <p:cNvSpPr>
             <a:spLocks noGrp="1"/>
           </p:cNvSpPr>
@@ -3881,7 +3930,7 @@
       </p:sp>
       <p:sp>
         <p:nvSpPr>
-          <p:cNvPr id="60" name="PlaceHolder 2"/>
+          <p:cNvPr id="61" name="PlaceHolder 2"/>
           <p:cNvSpPr>
             <a:spLocks noGrp="1"/>
           </p:cNvSpPr>
@@ -3934,7 +3983,7 @@
       </p:sp>
       <p:sp>
         <p:nvSpPr>
-          <p:cNvPr id="61" name="PlaceHolder 3"/>
+          <p:cNvPr id="62" name="PlaceHolder 3"/>
           <p:cNvSpPr>
             <a:spLocks noGrp="1"/>
           </p:cNvSpPr>
@@ -3987,7 +4036,7 @@
       </p:sp>
       <p:sp>
         <p:nvSpPr>
-          <p:cNvPr id="62" name="PlaceHolder 4"/>
+          <p:cNvPr id="63" name="PlaceHolder 4"/>
           <p:cNvSpPr>
             <a:spLocks noGrp="1"/>
           </p:cNvSpPr>
@@ -4040,7 +4089,7 @@
       </p:sp>
       <p:sp>
         <p:nvSpPr>
-          <p:cNvPr id="63" name="PlaceHolder 5"/>
+          <p:cNvPr id="64" name="PlaceHolder 5"/>
           <p:cNvSpPr>
             <a:spLocks noGrp="1"/>
           </p:cNvSpPr>

</xml_diff>